<commit_message>
Updated powerpoint week 4
week 4
</commit_message>
<xml_diff>
--- a/Powerpoints/CS0007 Week 4.pptx
+++ b/Powerpoints/CS0007 Week 4.pptx
@@ -6,11 +6,15 @@
   </p:sldMasterIdLst>
   <p:sldIdLst>
     <p:sldId id="256" r:id="rId2"/>
-    <p:sldId id="257" r:id="rId3"/>
-    <p:sldId id="259" r:id="rId4"/>
-    <p:sldId id="258" r:id="rId5"/>
-    <p:sldId id="260" r:id="rId6"/>
-    <p:sldId id="261" r:id="rId7"/>
+    <p:sldId id="265" r:id="rId3"/>
+    <p:sldId id="263" r:id="rId4"/>
+    <p:sldId id="262" r:id="rId5"/>
+    <p:sldId id="257" r:id="rId6"/>
+    <p:sldId id="259" r:id="rId7"/>
+    <p:sldId id="258" r:id="rId8"/>
+    <p:sldId id="264" r:id="rId9"/>
+    <p:sldId id="260" r:id="rId10"/>
+    <p:sldId id="261" r:id="rId11"/>
   </p:sldIdLst>
   <p:sldSz cx="12192000" cy="6858000"/>
   <p:notesSz cx="6858000" cy="9144000"/>
@@ -109,6 +113,11 @@
       </a:defRPr>
     </a:lvl9pPr>
   </p:defaultTextStyle>
+  <p:extLst>
+    <p:ext uri="{EFAFB233-063F-42B5-8137-9DF3F51BA10A}">
+      <p15:sldGuideLst xmlns:p15="http://schemas.microsoft.com/office/powerpoint/2012/main"/>
+    </p:ext>
+  </p:extLst>
 </p:presentation>
 </file>
 
@@ -243,7 +252,7 @@
           <a:p>
             <a:fld id="{20471FC3-0054-4667-9C11-FCDC0882F296}" type="datetimeFigureOut">
               <a:rPr lang="en-US" smtClean="0"/>
-              <a:t>1/24/2016</a:t>
+              <a:t>1/27/2016</a:t>
             </a:fld>
             <a:endParaRPr lang="en-US"/>
           </a:p>
@@ -413,7 +422,7 @@
           <a:p>
             <a:fld id="{20471FC3-0054-4667-9C11-FCDC0882F296}" type="datetimeFigureOut">
               <a:rPr lang="en-US" smtClean="0"/>
-              <a:t>1/24/2016</a:t>
+              <a:t>1/27/2016</a:t>
             </a:fld>
             <a:endParaRPr lang="en-US"/>
           </a:p>
@@ -593,7 +602,7 @@
           <a:p>
             <a:fld id="{20471FC3-0054-4667-9C11-FCDC0882F296}" type="datetimeFigureOut">
               <a:rPr lang="en-US" smtClean="0"/>
-              <a:t>1/24/2016</a:t>
+              <a:t>1/27/2016</a:t>
             </a:fld>
             <a:endParaRPr lang="en-US"/>
           </a:p>
@@ -763,7 +772,7 @@
           <a:p>
             <a:fld id="{20471FC3-0054-4667-9C11-FCDC0882F296}" type="datetimeFigureOut">
               <a:rPr lang="en-US" smtClean="0"/>
-              <a:t>1/24/2016</a:t>
+              <a:t>1/27/2016</a:t>
             </a:fld>
             <a:endParaRPr lang="en-US"/>
           </a:p>
@@ -1009,7 +1018,7 @@
           <a:p>
             <a:fld id="{20471FC3-0054-4667-9C11-FCDC0882F296}" type="datetimeFigureOut">
               <a:rPr lang="en-US" smtClean="0"/>
-              <a:t>1/24/2016</a:t>
+              <a:t>1/27/2016</a:t>
             </a:fld>
             <a:endParaRPr lang="en-US"/>
           </a:p>
@@ -1241,7 +1250,7 @@
           <a:p>
             <a:fld id="{20471FC3-0054-4667-9C11-FCDC0882F296}" type="datetimeFigureOut">
               <a:rPr lang="en-US" smtClean="0"/>
-              <a:t>1/24/2016</a:t>
+              <a:t>1/27/2016</a:t>
             </a:fld>
             <a:endParaRPr lang="en-US"/>
           </a:p>
@@ -1608,7 +1617,7 @@
           <a:p>
             <a:fld id="{20471FC3-0054-4667-9C11-FCDC0882F296}" type="datetimeFigureOut">
               <a:rPr lang="en-US" smtClean="0"/>
-              <a:t>1/24/2016</a:t>
+              <a:t>1/27/2016</a:t>
             </a:fld>
             <a:endParaRPr lang="en-US"/>
           </a:p>
@@ -1726,7 +1735,7 @@
           <a:p>
             <a:fld id="{20471FC3-0054-4667-9C11-FCDC0882F296}" type="datetimeFigureOut">
               <a:rPr lang="en-US" smtClean="0"/>
-              <a:t>1/24/2016</a:t>
+              <a:t>1/27/2016</a:t>
             </a:fld>
             <a:endParaRPr lang="en-US"/>
           </a:p>
@@ -1821,7 +1830,7 @@
           <a:p>
             <a:fld id="{20471FC3-0054-4667-9C11-FCDC0882F296}" type="datetimeFigureOut">
               <a:rPr lang="en-US" smtClean="0"/>
-              <a:t>1/24/2016</a:t>
+              <a:t>1/27/2016</a:t>
             </a:fld>
             <a:endParaRPr lang="en-US"/>
           </a:p>
@@ -2098,7 +2107,7 @@
           <a:p>
             <a:fld id="{20471FC3-0054-4667-9C11-FCDC0882F296}" type="datetimeFigureOut">
               <a:rPr lang="en-US" smtClean="0"/>
-              <a:t>1/24/2016</a:t>
+              <a:t>1/27/2016</a:t>
             </a:fld>
             <a:endParaRPr lang="en-US"/>
           </a:p>
@@ -2351,7 +2360,7 @@
           <a:p>
             <a:fld id="{20471FC3-0054-4667-9C11-FCDC0882F296}" type="datetimeFigureOut">
               <a:rPr lang="en-US" smtClean="0"/>
-              <a:t>1/24/2016</a:t>
+              <a:t>1/27/2016</a:t>
             </a:fld>
             <a:endParaRPr lang="en-US"/>
           </a:p>
@@ -2564,7 +2573,7 @@
           <a:p>
             <a:fld id="{20471FC3-0054-4667-9C11-FCDC0882F296}" type="datetimeFigureOut">
               <a:rPr lang="en-US" smtClean="0"/>
-              <a:t>1/24/2016</a:t>
+              <a:t>1/27/2016</a:t>
             </a:fld>
             <a:endParaRPr lang="en-US"/>
           </a:p>
@@ -2986,7 +2995,14 @@
           <a:p>
             <a:r>
               <a:rPr lang="en-US" dirty="0" smtClean="0"/>
-              <a:t>Recitation</a:t>
+              <a:t>James Hahn</a:t>
+            </a:r>
+            <a:br>
+              <a:rPr lang="en-US" dirty="0" smtClean="0"/>
+            </a:br>
+            <a:r>
+              <a:rPr lang="en-US" dirty="0" smtClean="0"/>
+              <a:t>CS0007 Recitation</a:t>
             </a:r>
             <a:endParaRPr lang="en-US" dirty="0"/>
           </a:p>
@@ -3004,14 +3020,36 @@
         </p:nvSpPr>
         <p:spPr/>
         <p:txBody>
-          <a:bodyPr/>
+          <a:bodyPr>
+            <a:normAutofit lnSpcReduction="10000"/>
+          </a:bodyPr>
           <a:lstStyle/>
           <a:p>
             <a:r>
               <a:rPr lang="en-US" dirty="0" smtClean="0"/>
               <a:t>Week 4</a:t>
             </a:r>
-            <a:endParaRPr lang="en-US" dirty="0"/>
+          </a:p>
+          <a:p>
+            <a:r>
+              <a:rPr lang="en-US" dirty="0" smtClean="0">
+                <a:hlinkClick r:id="rId2"/>
+              </a:rPr>
+              <a:t>jrh160@pitt.edu</a:t>
+            </a:r>
+            <a:endParaRPr lang="en-US" dirty="0" smtClean="0"/>
+          </a:p>
+          <a:p>
+            <a:r>
+              <a:rPr lang="en-US" dirty="0" smtClean="0"/>
+              <a:t>M 1-3pm SENSQ 6506</a:t>
+            </a:r>
+          </a:p>
+          <a:p>
+            <a:r>
+              <a:rPr lang="en-US" dirty="0" smtClean="0"/>
+              <a:t>W 2-3pm SENSQ 6506</a:t>
+            </a:r>
           </a:p>
         </p:txBody>
       </p:sp>
@@ -3019,6 +3057,280 @@
     <p:extLst>
       <p:ext uri="{BB962C8B-B14F-4D97-AF65-F5344CB8AC3E}">
         <p14:creationId xmlns:p14="http://schemas.microsoft.com/office/powerpoint/2010/main" val="2123611938"/>
+      </p:ext>
+    </p:extLst>
+  </p:cSld>
+  <p:clrMapOvr>
+    <a:masterClrMapping/>
+  </p:clrMapOvr>
+</p:sld>
+</file>
+
+<file path=ppt/slides/slide10.xml><?xml version="1.0" encoding="utf-8"?>
+<p:sld xmlns:a="http://schemas.openxmlformats.org/drawingml/2006/main" xmlns:r="http://schemas.openxmlformats.org/officeDocument/2006/relationships" xmlns:p="http://schemas.openxmlformats.org/presentationml/2006/main">
+  <p:cSld>
+    <p:spTree>
+      <p:nvGrpSpPr>
+        <p:cNvPr id="1" name=""/>
+        <p:cNvGrpSpPr/>
+        <p:nvPr/>
+      </p:nvGrpSpPr>
+      <p:grpSpPr>
+        <a:xfrm>
+          <a:off x="0" y="0"/>
+          <a:ext cx="0" cy="0"/>
+          <a:chOff x="0" y="0"/>
+          <a:chExt cx="0" cy="0"/>
+        </a:xfrm>
+      </p:grpSpPr>
+      <p:sp>
+        <p:nvSpPr>
+          <p:cNvPr id="2" name="Title 1"/>
+          <p:cNvSpPr>
+            <a:spLocks noGrp="1"/>
+          </p:cNvSpPr>
+          <p:nvPr>
+            <p:ph type="title"/>
+          </p:nvPr>
+        </p:nvSpPr>
+        <p:spPr/>
+        <p:txBody>
+          <a:bodyPr/>
+          <a:lstStyle/>
+          <a:p>
+            <a:r>
+              <a:rPr lang="en-US" dirty="0" smtClean="0"/>
+              <a:t>Calculations ( +, -, *, / )</a:t>
+            </a:r>
+            <a:endParaRPr lang="en-US" dirty="0"/>
+          </a:p>
+        </p:txBody>
+      </p:sp>
+      <p:sp>
+        <p:nvSpPr>
+          <p:cNvPr id="3" name="Content Placeholder 2"/>
+          <p:cNvSpPr>
+            <a:spLocks noGrp="1"/>
+          </p:cNvSpPr>
+          <p:nvPr>
+            <p:ph idx="1"/>
+          </p:nvPr>
+        </p:nvSpPr>
+        <p:spPr/>
+        <p:txBody>
+          <a:bodyPr>
+            <a:normAutofit lnSpcReduction="10000"/>
+          </a:bodyPr>
+          <a:lstStyle/>
+          <a:p>
+            <a:pPr marL="0" indent="0">
+              <a:buNone/>
+            </a:pPr>
+            <a:r>
+              <a:rPr lang="en-US" dirty="0" smtClean="0"/>
+              <a:t>Multiplication and Division:</a:t>
+            </a:r>
+          </a:p>
+          <a:p>
+            <a:pPr marL="0" indent="0">
+              <a:buNone/>
+            </a:pPr>
+            <a:r>
+              <a:rPr lang="en-US" dirty="0"/>
+              <a:t>	</a:t>
+            </a:r>
+            <a:r>
+              <a:rPr lang="en-US" dirty="0" err="1" smtClean="0"/>
+              <a:t>monthlyElectric</a:t>
+            </a:r>
+            <a:r>
+              <a:rPr lang="en-US" dirty="0" smtClean="0"/>
+              <a:t> = (</a:t>
+            </a:r>
+            <a:r>
+              <a:rPr lang="en-US" dirty="0" err="1" smtClean="0"/>
+              <a:t>electricPayPercent</a:t>
+            </a:r>
+            <a:r>
+              <a:rPr lang="en-US" dirty="0" smtClean="0"/>
+              <a:t>*.01) * </a:t>
+            </a:r>
+            <a:r>
+              <a:rPr lang="en-US" dirty="0" err="1" smtClean="0"/>
+              <a:t>monthlyPay</a:t>
+            </a:r>
+            <a:r>
+              <a:rPr lang="en-US" dirty="0" smtClean="0"/>
+              <a:t>;</a:t>
+            </a:r>
+          </a:p>
+          <a:p>
+            <a:pPr marL="0" indent="0">
+              <a:buNone/>
+            </a:pPr>
+            <a:r>
+              <a:rPr lang="en-US" dirty="0"/>
+              <a:t>	</a:t>
+            </a:r>
+            <a:r>
+              <a:rPr lang="en-US" dirty="0" err="1" smtClean="0"/>
+              <a:t>monthlyWater</a:t>
+            </a:r>
+            <a:r>
+              <a:rPr lang="en-US" dirty="0" smtClean="0"/>
+              <a:t> = (</a:t>
+            </a:r>
+            <a:r>
+              <a:rPr lang="en-US" dirty="0" err="1" smtClean="0"/>
+              <a:t>waterPayPercent</a:t>
+            </a:r>
+            <a:r>
+              <a:rPr lang="en-US" dirty="0" smtClean="0"/>
+              <a:t>*.01) * </a:t>
+            </a:r>
+            <a:r>
+              <a:rPr lang="en-US" dirty="0" err="1" smtClean="0"/>
+              <a:t>monthlyPay</a:t>
+            </a:r>
+            <a:r>
+              <a:rPr lang="en-US" dirty="0" smtClean="0"/>
+              <a:t>;</a:t>
+            </a:r>
+          </a:p>
+          <a:p>
+            <a:pPr marL="0" indent="0">
+              <a:buNone/>
+            </a:pPr>
+            <a:r>
+              <a:rPr lang="en-US" dirty="0"/>
+              <a:t>	</a:t>
+            </a:r>
+            <a:r>
+              <a:rPr lang="en-US" dirty="0" err="1" smtClean="0"/>
+              <a:t>foodPayPercent</a:t>
+            </a:r>
+            <a:r>
+              <a:rPr lang="en-US" dirty="0" smtClean="0"/>
+              <a:t> = </a:t>
+            </a:r>
+            <a:r>
+              <a:rPr lang="en-US" dirty="0" err="1" smtClean="0"/>
+              <a:t>foodBudget</a:t>
+            </a:r>
+            <a:r>
+              <a:rPr lang="en-US" dirty="0" smtClean="0"/>
+              <a:t>/</a:t>
+            </a:r>
+            <a:r>
+              <a:rPr lang="en-US" dirty="0" err="1" smtClean="0"/>
+              <a:t>monthlyPay</a:t>
+            </a:r>
+            <a:r>
+              <a:rPr lang="en-US" dirty="0" smtClean="0"/>
+              <a:t>;</a:t>
+            </a:r>
+          </a:p>
+          <a:p>
+            <a:pPr marL="0" indent="0">
+              <a:buNone/>
+            </a:pPr>
+            <a:endParaRPr lang="en-US" dirty="0"/>
+          </a:p>
+          <a:p>
+            <a:pPr marL="0" indent="0">
+              <a:buNone/>
+            </a:pPr>
+            <a:r>
+              <a:rPr lang="en-US" dirty="0" smtClean="0"/>
+              <a:t>Addition and Subtraction:</a:t>
+            </a:r>
+          </a:p>
+          <a:p>
+            <a:pPr marL="0" indent="0">
+              <a:buNone/>
+            </a:pPr>
+            <a:r>
+              <a:rPr lang="en-US" dirty="0"/>
+              <a:t>	</a:t>
+            </a:r>
+            <a:r>
+              <a:rPr lang="en-US" dirty="0" err="1" smtClean="0"/>
+              <a:t>monthlyExpenses</a:t>
+            </a:r>
+            <a:r>
+              <a:rPr lang="en-US" dirty="0" smtClean="0"/>
+              <a:t> = </a:t>
+            </a:r>
+            <a:r>
+              <a:rPr lang="en-US" dirty="0" err="1" smtClean="0"/>
+              <a:t>monthlyElectric</a:t>
+            </a:r>
+            <a:r>
+              <a:rPr lang="en-US" dirty="0" smtClean="0"/>
+              <a:t> + </a:t>
+            </a:r>
+            <a:r>
+              <a:rPr lang="en-US" dirty="0" err="1" smtClean="0"/>
+              <a:t>monthlyWater</a:t>
+            </a:r>
+            <a:r>
+              <a:rPr lang="en-US" dirty="0" smtClean="0"/>
+              <a:t>;</a:t>
+            </a:r>
+          </a:p>
+          <a:p>
+            <a:pPr marL="0" indent="0">
+              <a:buNone/>
+            </a:pPr>
+            <a:r>
+              <a:rPr lang="en-US" dirty="0" smtClean="0"/>
+              <a:t>	</a:t>
+            </a:r>
+            <a:r>
+              <a:rPr lang="en-US" dirty="0" err="1" smtClean="0"/>
+              <a:t>monthlyNetPay</a:t>
+            </a:r>
+            <a:r>
+              <a:rPr lang="en-US" dirty="0" smtClean="0"/>
+              <a:t> = </a:t>
+            </a:r>
+            <a:r>
+              <a:rPr lang="en-US" dirty="0" err="1" smtClean="0"/>
+              <a:t>monthlyPay</a:t>
+            </a:r>
+            <a:r>
+              <a:rPr lang="en-US" dirty="0" smtClean="0"/>
+              <a:t> - </a:t>
+            </a:r>
+            <a:r>
+              <a:rPr lang="en-US" dirty="0" err="1" smtClean="0"/>
+              <a:t>monthlyExpenses</a:t>
+            </a:r>
+            <a:r>
+              <a:rPr lang="en-US" dirty="0" smtClean="0"/>
+              <a:t>;</a:t>
+            </a:r>
+            <a:r>
+              <a:rPr lang="en-US" dirty="0"/>
+              <a:t>	</a:t>
+            </a:r>
+            <a:endParaRPr lang="en-US" dirty="0" smtClean="0"/>
+          </a:p>
+          <a:p>
+            <a:pPr marL="0" indent="0">
+              <a:buNone/>
+            </a:pPr>
+            <a:r>
+              <a:rPr lang="en-US" dirty="0"/>
+              <a:t>	</a:t>
+            </a:r>
+          </a:p>
+        </p:txBody>
+      </p:sp>
+    </p:spTree>
+    <p:extLst>
+      <p:ext uri="{BB962C8B-B14F-4D97-AF65-F5344CB8AC3E}">
+        <p14:creationId xmlns:p14="http://schemas.microsoft.com/office/powerpoint/2010/main" val="4279312857"/>
       </p:ext>
     </p:extLst>
   </p:cSld>
@@ -3062,7 +3374,7 @@
           <a:p>
             <a:r>
               <a:rPr lang="en-US" dirty="0" smtClean="0"/>
-              <a:t>Activity 1</a:t>
+              <a:t>More Help</a:t>
             </a:r>
             <a:endParaRPr lang="en-US" dirty="0"/>
           </a:p>
@@ -3084,12 +3396,69 @@
           <a:lstStyle/>
           <a:p>
             <a:r>
+              <a:rPr lang="en-US" dirty="0" smtClean="0"/>
+              <a:t>Seth Sheetz (can also be found on </a:t>
+            </a:r>
+            <a:r>
               <a:rPr lang="en-US" dirty="0" err="1" smtClean="0"/>
-              <a:t>System.out.println</a:t>
-            </a:r>
-            <a:r>
-              <a:rPr lang="en-US" dirty="0" smtClean="0"/>
-              <a:t>(“My name is James. This program will create a budget calculator.”);</a:t>
+              <a:t>CourseWeb</a:t>
+            </a:r>
+            <a:r>
+              <a:rPr lang="en-US" dirty="0" smtClean="0"/>
+              <a:t>)</a:t>
+            </a:r>
+          </a:p>
+          <a:p>
+            <a:pPr lvl="1"/>
+            <a:r>
+              <a:rPr lang="en-US" dirty="0" smtClean="0"/>
+              <a:t>M 7:30-8:30pm</a:t>
+            </a:r>
+          </a:p>
+          <a:p>
+            <a:pPr lvl="1"/>
+            <a:r>
+              <a:rPr lang="en-US" dirty="0"/>
+              <a:t>F</a:t>
+            </a:r>
+            <a:r>
+              <a:rPr lang="en-US" dirty="0" smtClean="0"/>
+              <a:t> 10am-12pm</a:t>
+            </a:r>
+          </a:p>
+          <a:p>
+            <a:pPr lvl="1"/>
+            <a:r>
+              <a:rPr lang="en-US" dirty="0" smtClean="0"/>
+              <a:t>SENSQ 6506</a:t>
+            </a:r>
+          </a:p>
+          <a:p>
+            <a:pPr marL="457200" lvl="1" indent="0">
+              <a:buNone/>
+            </a:pPr>
+            <a:endParaRPr lang="en-US" dirty="0"/>
+          </a:p>
+          <a:p>
+            <a:pPr marL="457200" lvl="1" indent="0">
+              <a:buNone/>
+            </a:pPr>
+            <a:r>
+              <a:rPr lang="en-US" dirty="0" smtClean="0"/>
+              <a:t>Computer Science Resource Center (CRC)</a:t>
+            </a:r>
+          </a:p>
+          <a:p>
+            <a:pPr marL="457200" lvl="1" indent="0">
+              <a:buNone/>
+            </a:pPr>
+            <a:r>
+              <a:rPr lang="en-US" dirty="0"/>
+              <a:t>	</a:t>
+            </a:r>
+            <a:r>
+              <a:rPr lang="en-US" dirty="0" smtClean="0"/>
+              <a:t>5710 SENSQ</a:t>
             </a:r>
             <a:endParaRPr lang="en-US" dirty="0"/>
           </a:p>
@@ -3098,7 +3467,7 @@
     </p:spTree>
     <p:extLst>
       <p:ext uri="{BB962C8B-B14F-4D97-AF65-F5344CB8AC3E}">
-        <p14:creationId xmlns:p14="http://schemas.microsoft.com/office/powerpoint/2010/main" val="3040086864"/>
+        <p14:creationId xmlns:p14="http://schemas.microsoft.com/office/powerpoint/2010/main" val="3627101941"/>
       </p:ext>
     </p:extLst>
   </p:cSld>
@@ -3142,7 +3511,7 @@
           <a:p>
             <a:r>
               <a:rPr lang="en-US" dirty="0" smtClean="0"/>
-              <a:t>Activity 2</a:t>
+              <a:t>REMEMBER</a:t>
             </a:r>
             <a:endParaRPr lang="en-US" dirty="0"/>
           </a:p>
@@ -3163,24 +3532,28 @@
           <a:bodyPr/>
           <a:lstStyle/>
           <a:p>
+            <a:r>
+              <a:rPr lang="en-US" dirty="0" smtClean="0"/>
+              <a:t>At the top of your programs, always comment your header</a:t>
+            </a:r>
+          </a:p>
+          <a:p>
+            <a:r>
+              <a:rPr lang="en-US" dirty="0" smtClean="0"/>
+              <a:t>/*Author Name</a:t>
+            </a:r>
+          </a:p>
+          <a:p>
             <a:pPr marL="0" indent="0">
               <a:buNone/>
             </a:pPr>
             <a:r>
               <a:rPr lang="en-US" dirty="0"/>
-              <a:t>d</a:t>
-            </a:r>
-            <a:r>
-              <a:rPr lang="en-US" dirty="0" smtClean="0"/>
-              <a:t>ouble </a:t>
-            </a:r>
-            <a:r>
-              <a:rPr lang="en-US" dirty="0" err="1" smtClean="0"/>
-              <a:t>rateHourly</a:t>
-            </a:r>
-            <a:r>
-              <a:rPr lang="en-US" dirty="0" smtClean="0"/>
-              <a:t>; //Regular hourly pay rate</a:t>
+              <a:t>	</a:t>
+            </a:r>
+            <a:r>
+              <a:rPr lang="en-US" dirty="0" smtClean="0"/>
+              <a:t>Project Description</a:t>
             </a:r>
           </a:p>
           <a:p>
@@ -3189,43 +3562,38 @@
             </a:pPr>
             <a:r>
               <a:rPr lang="en-US" dirty="0"/>
-              <a:t>d</a:t>
-            </a:r>
-            <a:r>
-              <a:rPr lang="en-US" dirty="0" smtClean="0"/>
-              <a:t>ouble </a:t>
-            </a:r>
-            <a:r>
-              <a:rPr lang="en-US" dirty="0" err="1" smtClean="0"/>
-              <a:t>rateOvertime</a:t>
-            </a:r>
-            <a:r>
-              <a:rPr lang="en-US" dirty="0" smtClean="0"/>
-              <a:t>; //Overtime hourly pay rate</a:t>
+              <a:t>	</a:t>
+            </a:r>
+            <a:r>
+              <a:rPr lang="en-US" dirty="0" smtClean="0"/>
+              <a:t>Start Date</a:t>
             </a:r>
           </a:p>
           <a:p>
             <a:pPr marL="0" indent="0">
               <a:buNone/>
             </a:pPr>
-            <a:endParaRPr lang="en-US" dirty="0"/>
-          </a:p>
-          <a:p>
-            <a:pPr marL="0" indent="0">
-              <a:buNone/>
-            </a:pPr>
-            <a:r>
-              <a:rPr lang="en-US" dirty="0" smtClean="0"/>
-              <a:t>…</a:t>
-            </a:r>
-            <a:endParaRPr lang="en-US" dirty="0"/>
+            <a:r>
+              <a:rPr lang="en-US" dirty="0"/>
+              <a:t>	</a:t>
+            </a:r>
+            <a:r>
+              <a:rPr lang="en-US" dirty="0" smtClean="0"/>
+              <a:t>Last Modification Date*/</a:t>
+            </a:r>
+          </a:p>
+          <a:p>
+            <a:r>
+              <a:rPr lang="en-US" dirty="0" smtClean="0"/>
+              <a:t>Use the best variables for each piece of data</a:t>
+            </a:r>
           </a:p>
         </p:txBody>
       </p:sp>
     </p:spTree>
     <p:extLst>
       <p:ext uri="{BB962C8B-B14F-4D97-AF65-F5344CB8AC3E}">
-        <p14:creationId xmlns:p14="http://schemas.microsoft.com/office/powerpoint/2010/main" val="297399840"/>
+        <p14:creationId xmlns:p14="http://schemas.microsoft.com/office/powerpoint/2010/main" val="519245759"/>
       </p:ext>
     </p:extLst>
   </p:cSld>
@@ -3269,7 +3637,7 @@
           <a:p>
             <a:r>
               <a:rPr lang="en-US" dirty="0" smtClean="0"/>
-              <a:t>Activity 3</a:t>
+              <a:t>Command prompt/terminal</a:t>
             </a:r>
             <a:endParaRPr lang="en-US" dirty="0"/>
           </a:p>
@@ -3290,109 +3658,22 @@
           <a:bodyPr/>
           <a:lstStyle/>
           <a:p>
-            <a:pPr marL="0" indent="0">
-              <a:buNone/>
-            </a:pPr>
-            <a:r>
-              <a:rPr lang="en-US" dirty="0" smtClean="0"/>
-              <a:t>public static String </a:t>
-            </a:r>
             <a:r>
               <a:rPr lang="en-US" dirty="0" err="1" smtClean="0"/>
-              <a:t>promptUser</a:t>
-            </a:r>
-            <a:r>
-              <a:rPr lang="en-US" dirty="0" smtClean="0"/>
-              <a:t>(){</a:t>
-            </a:r>
-          </a:p>
-          <a:p>
-            <a:pPr marL="0" indent="0">
-              <a:buNone/>
-            </a:pPr>
-            <a:r>
-              <a:rPr lang="en-US" dirty="0"/>
-              <a:t>	</a:t>
-            </a:r>
-            <a:r>
-              <a:rPr lang="en-US" dirty="0" smtClean="0"/>
-              <a:t>Scanner </a:t>
-            </a:r>
-            <a:r>
-              <a:rPr lang="en-US" dirty="0" err="1" smtClean="0"/>
-              <a:t>sc</a:t>
-            </a:r>
-            <a:r>
-              <a:rPr lang="en-US" dirty="0" smtClean="0"/>
-              <a:t> = new Scanner(System.in);</a:t>
-            </a:r>
-          </a:p>
-          <a:p>
-            <a:pPr marL="0" indent="0">
-              <a:buNone/>
-            </a:pPr>
+              <a:t>javac</a:t>
+            </a:r>
             <a:endParaRPr lang="en-US" dirty="0"/>
           </a:p>
           <a:p>
-            <a:pPr marL="0" indent="0">
-              <a:buNone/>
-            </a:pPr>
-            <a:r>
-              <a:rPr lang="en-US" dirty="0" smtClean="0"/>
-              <a:t>	String </a:t>
-            </a:r>
-            <a:r>
-              <a:rPr lang="en-US" dirty="0" err="1" smtClean="0"/>
-              <a:t>userName</a:t>
-            </a:r>
-            <a:r>
-              <a:rPr lang="en-US" dirty="0" smtClean="0"/>
-              <a:t> = </a:t>
-            </a:r>
-            <a:r>
-              <a:rPr lang="en-US" dirty="0" err="1" smtClean="0"/>
-              <a:t>sc.next</a:t>
-            </a:r>
-            <a:r>
-              <a:rPr lang="en-US" dirty="0" smtClean="0"/>
-              <a:t>();</a:t>
-            </a:r>
-          </a:p>
-          <a:p>
-            <a:pPr marL="0" indent="0">
-              <a:buNone/>
-            </a:pPr>
-            <a:endParaRPr lang="en-US" dirty="0"/>
-          </a:p>
-          <a:p>
-            <a:pPr marL="0" indent="0">
-              <a:buNone/>
-            </a:pPr>
-            <a:r>
-              <a:rPr lang="en-US" dirty="0"/>
-              <a:t>	</a:t>
-            </a:r>
-            <a:r>
-              <a:rPr lang="en-US" dirty="0" smtClean="0"/>
-              <a:t>return </a:t>
-            </a:r>
-            <a:r>
-              <a:rPr lang="en-US" dirty="0" err="1" smtClean="0"/>
-              <a:t>userName</a:t>
-            </a:r>
-            <a:r>
-              <a:rPr lang="en-US" dirty="0" smtClean="0"/>
-              <a:t>;</a:t>
-            </a:r>
-            <a:endParaRPr lang="en-US" dirty="0"/>
-          </a:p>
-          <a:p>
-            <a:pPr marL="0" indent="0">
-              <a:buNone/>
-            </a:pPr>
-            <a:r>
-              <a:rPr lang="en-US" dirty="0" smtClean="0"/>
-              <a:t>}</a:t>
+            <a:r>
+              <a:rPr lang="en-US" dirty="0" smtClean="0"/>
+              <a:t>java</a:t>
+            </a:r>
+          </a:p>
+          <a:p>
+            <a:r>
+              <a:rPr lang="en-US" dirty="0" smtClean="0"/>
+              <a:t>cd</a:t>
             </a:r>
             <a:endParaRPr lang="en-US" dirty="0"/>
           </a:p>
@@ -3401,7 +3682,7 @@
     </p:spTree>
     <p:extLst>
       <p:ext uri="{BB962C8B-B14F-4D97-AF65-F5344CB8AC3E}">
-        <p14:creationId xmlns:p14="http://schemas.microsoft.com/office/powerpoint/2010/main" val="135158590"/>
+        <p14:creationId xmlns:p14="http://schemas.microsoft.com/office/powerpoint/2010/main" val="1202392871"/>
       </p:ext>
     </p:extLst>
   </p:cSld>
@@ -3445,7 +3726,7 @@
           <a:p>
             <a:r>
               <a:rPr lang="en-US" dirty="0" smtClean="0"/>
-              <a:t>Command-line input</a:t>
+              <a:t>Activity 1</a:t>
             </a:r>
             <a:endParaRPr lang="en-US" dirty="0"/>
           </a:p>
@@ -3467,61 +3748,40 @@
           <a:lstStyle/>
           <a:p>
             <a:r>
-              <a:rPr lang="en-US" dirty="0" smtClean="0"/>
-              <a:t>Use Scanner (let’s pretend the Scanner variable is named </a:t>
-            </a:r>
-            <a:r>
               <a:rPr lang="en-US" dirty="0" err="1" smtClean="0"/>
-              <a:t>sc</a:t>
-            </a:r>
-            <a:r>
-              <a:rPr lang="en-US" dirty="0" smtClean="0"/>
-              <a:t>):</a:t>
-            </a:r>
-          </a:p>
-          <a:p>
-            <a:pPr marL="457200" lvl="1" indent="0">
-              <a:buNone/>
-            </a:pPr>
-            <a:r>
-              <a:rPr lang="en-US" dirty="0" smtClean="0"/>
-              <a:t>Scanner </a:t>
-            </a:r>
-            <a:r>
-              <a:rPr lang="en-US" dirty="0" err="1" smtClean="0"/>
-              <a:t>sc</a:t>
-            </a:r>
-            <a:r>
-              <a:rPr lang="en-US" dirty="0" smtClean="0"/>
-              <a:t> = new Scanner(System.in);</a:t>
-            </a:r>
-          </a:p>
-          <a:p>
-            <a:r>
-              <a:rPr lang="en-US" dirty="0" smtClean="0"/>
-              <a:t>To grab the next String entered by a user, use </a:t>
-            </a:r>
-            <a:r>
-              <a:rPr lang="en-US" dirty="0" err="1" smtClean="0"/>
-              <a:t>sc.next</a:t>
-            </a:r>
-            <a:r>
-              <a:rPr lang="en-US" dirty="0" smtClean="0"/>
-              <a:t>();</a:t>
-            </a:r>
-          </a:p>
-          <a:p>
-            <a:r>
-              <a:rPr lang="en-US" dirty="0" smtClean="0"/>
-              <a:t>To grab the next </a:t>
-            </a:r>
-            <a:r>
-              <a:rPr lang="en-US" dirty="0" err="1" smtClean="0"/>
-              <a:t>int</a:t>
-            </a:r>
-            <a:r>
-              <a:rPr lang="en-US" dirty="0" smtClean="0"/>
-              <a:t> or double or float, use if statements</a:t>
+              <a:t>System.out.println</a:t>
+            </a:r>
+            <a:r>
+              <a:rPr lang="en-US" dirty="0" smtClean="0"/>
+              <a:t>(“My name is </a:t>
+            </a:r>
+            <a:r>
+              <a:rPr lang="en-US" dirty="0" smtClean="0"/>
+              <a:t>James</a:t>
+            </a:r>
+            <a:r>
+              <a:rPr lang="en-US" dirty="0"/>
+              <a:t> </a:t>
+            </a:r>
+            <a:r>
+              <a:rPr lang="en-US" dirty="0" smtClean="0"/>
+              <a:t>Hahn and this budget calculator will transform your empty pockets into cash!</a:t>
+            </a:r>
+            <a:r>
+              <a:rPr lang="en-US" dirty="0" smtClean="0"/>
+              <a:t>”);</a:t>
+            </a:r>
+          </a:p>
+          <a:p>
+            <a:r>
+              <a:rPr lang="en-US" dirty="0" smtClean="0"/>
+              <a:t>Be persuasive/user-friendly</a:t>
+            </a:r>
+          </a:p>
+          <a:p>
+            <a:r>
+              <a:rPr lang="en-US" dirty="0" smtClean="0"/>
+              <a:t>Why does the user want to use this?</a:t>
             </a:r>
           </a:p>
           <a:p>
@@ -3532,7 +3792,7 @@
     </p:spTree>
     <p:extLst>
       <p:ext uri="{BB962C8B-B14F-4D97-AF65-F5344CB8AC3E}">
-        <p14:creationId xmlns:p14="http://schemas.microsoft.com/office/powerpoint/2010/main" val="1459983907"/>
+        <p14:creationId xmlns:p14="http://schemas.microsoft.com/office/powerpoint/2010/main" val="3040086864"/>
       </p:ext>
     </p:extLst>
   </p:cSld>
@@ -3576,7 +3836,7 @@
           <a:p>
             <a:r>
               <a:rPr lang="en-US" dirty="0" smtClean="0"/>
-              <a:t>Calculations ( +, -, *, / )</a:t>
+              <a:t>Activity 2</a:t>
             </a:r>
             <a:endParaRPr lang="en-US" dirty="0"/>
           </a:p>
@@ -3594,17 +3854,27 @@
         </p:nvSpPr>
         <p:spPr/>
         <p:txBody>
-          <a:bodyPr>
-            <a:normAutofit lnSpcReduction="10000"/>
-          </a:bodyPr>
+          <a:bodyPr/>
           <a:lstStyle/>
           <a:p>
             <a:pPr marL="0" indent="0">
               <a:buNone/>
             </a:pPr>
             <a:r>
-              <a:rPr lang="en-US" dirty="0" smtClean="0"/>
-              <a:t>Multiplication and Division:</a:t>
+              <a:rPr lang="en-US" dirty="0"/>
+              <a:t>d</a:t>
+            </a:r>
+            <a:r>
+              <a:rPr lang="en-US" dirty="0" smtClean="0"/>
+              <a:t>ouble </a:t>
+            </a:r>
+            <a:r>
+              <a:rPr lang="en-US" dirty="0" err="1" smtClean="0"/>
+              <a:t>rateHourly</a:t>
+            </a:r>
+            <a:r>
+              <a:rPr lang="en-US" dirty="0" smtClean="0"/>
+              <a:t>; //Regular hourly pay rate</a:t>
             </a:r>
           </a:p>
           <a:p>
@@ -3613,97 +3883,19 @@
             </a:pPr>
             <a:r>
               <a:rPr lang="en-US" dirty="0"/>
-              <a:t>	</a:t>
+              <a:t>d</a:t>
+            </a:r>
+            <a:r>
+              <a:rPr lang="en-US" dirty="0" smtClean="0"/>
+              <a:t>ouble </a:t>
             </a:r>
             <a:r>
               <a:rPr lang="en-US" dirty="0" err="1" smtClean="0"/>
-              <a:t>monthlyElectric</a:t>
-            </a:r>
-            <a:r>
-              <a:rPr lang="en-US" dirty="0" smtClean="0"/>
-              <a:t> = (</a:t>
-            </a:r>
-            <a:r>
-              <a:rPr lang="en-US" dirty="0" err="1" smtClean="0"/>
-              <a:t>electricPayPercent</a:t>
-            </a:r>
-            <a:r>
-              <a:rPr lang="en-US" dirty="0" smtClean="0"/>
-              <a:t>*.01) * </a:t>
-            </a:r>
-            <a:r>
-              <a:rPr lang="en-US" dirty="0" err="1" smtClean="0"/>
-              <a:t>monthlyPay</a:t>
-            </a:r>
-            <a:r>
-              <a:rPr lang="en-US" dirty="0" smtClean="0"/>
-              <a:t>;</a:t>
-            </a:r>
-          </a:p>
-          <a:p>
-            <a:pPr marL="0" indent="0">
-              <a:buNone/>
-            </a:pPr>
-            <a:r>
-              <a:rPr lang="en-US" dirty="0"/>
-              <a:t>	</a:t>
-            </a:r>
-            <a:r>
-              <a:rPr lang="en-US" dirty="0" err="1" smtClean="0"/>
-              <a:t>monthlyWater</a:t>
-            </a:r>
-            <a:r>
-              <a:rPr lang="en-US" dirty="0" smtClean="0"/>
-              <a:t> = (</a:t>
-            </a:r>
-            <a:r>
-              <a:rPr lang="en-US" dirty="0" err="1" smtClean="0"/>
-              <a:t>waterPayPercent</a:t>
-            </a:r>
-            <a:r>
-              <a:rPr lang="en-US" dirty="0" smtClean="0"/>
-              <a:t>*.01) * </a:t>
-            </a:r>
-            <a:r>
-              <a:rPr lang="en-US" dirty="0" err="1" smtClean="0"/>
-              <a:t>monthlyPay</a:t>
-            </a:r>
-            <a:r>
-              <a:rPr lang="en-US" dirty="0" smtClean="0"/>
-              <a:t>;</a:t>
-            </a:r>
-          </a:p>
-          <a:p>
-            <a:pPr marL="0" indent="0">
-              <a:buNone/>
-            </a:pPr>
-            <a:r>
-              <a:rPr lang="en-US" dirty="0"/>
-              <a:t>	</a:t>
-            </a:r>
-            <a:r>
-              <a:rPr lang="en-US" dirty="0" err="1" smtClean="0"/>
-              <a:t>foodPayPercent</a:t>
-            </a:r>
-            <a:r>
-              <a:rPr lang="en-US" dirty="0" smtClean="0"/>
-              <a:t> = </a:t>
-            </a:r>
-            <a:r>
-              <a:rPr lang="en-US" dirty="0" err="1" smtClean="0"/>
-              <a:t>foodBudget</a:t>
-            </a:r>
-            <a:r>
-              <a:rPr lang="en-US" dirty="0" smtClean="0"/>
-              <a:t>/</a:t>
-            </a:r>
-            <a:r>
-              <a:rPr lang="en-US" dirty="0" err="1" smtClean="0"/>
-              <a:t>monthlyPay</a:t>
-            </a:r>
-            <a:r>
-              <a:rPr lang="en-US" dirty="0" smtClean="0"/>
-              <a:t>;</a:t>
+              <a:t>rateOvertime</a:t>
+            </a:r>
+            <a:r>
+              <a:rPr lang="en-US" dirty="0" smtClean="0"/>
+              <a:t>; //Overtime hourly pay rate</a:t>
             </a:r>
           </a:p>
           <a:p>
@@ -3718,95 +3910,423 @@
             </a:pPr>
             <a:r>
               <a:rPr lang="en-US" dirty="0" smtClean="0"/>
-              <a:t>Addition and Subtraction:</a:t>
-            </a:r>
-          </a:p>
-          <a:p>
-            <a:pPr marL="0" indent="0">
-              <a:buNone/>
-            </a:pPr>
-            <a:r>
-              <a:rPr lang="en-US" dirty="0"/>
-              <a:t>	</a:t>
-            </a:r>
-            <a:r>
-              <a:rPr lang="en-US" dirty="0" err="1" smtClean="0"/>
-              <a:t>monthlyExpenses</a:t>
-            </a:r>
-            <a:r>
-              <a:rPr lang="en-US" dirty="0" smtClean="0"/>
-              <a:t> = </a:t>
-            </a:r>
-            <a:r>
-              <a:rPr lang="en-US" dirty="0" err="1" smtClean="0"/>
-              <a:t>monthlyElectric</a:t>
-            </a:r>
-            <a:r>
-              <a:rPr lang="en-US" dirty="0" smtClean="0"/>
-              <a:t> + </a:t>
-            </a:r>
-            <a:r>
-              <a:rPr lang="en-US" dirty="0" err="1" smtClean="0"/>
-              <a:t>monthlyWater</a:t>
-            </a:r>
-            <a:r>
-              <a:rPr lang="en-US" dirty="0" smtClean="0"/>
-              <a:t>;</a:t>
-            </a:r>
-          </a:p>
-          <a:p>
-            <a:pPr marL="0" indent="0">
-              <a:buNone/>
-            </a:pPr>
-            <a:r>
-              <a:rPr lang="en-US" dirty="0" smtClean="0"/>
-              <a:t>	</a:t>
-            </a:r>
-            <a:r>
-              <a:rPr lang="en-US" dirty="0" err="1" smtClean="0"/>
-              <a:t>monthlyNetPay</a:t>
-            </a:r>
-            <a:r>
-              <a:rPr lang="en-US" dirty="0" smtClean="0"/>
-              <a:t> = </a:t>
-            </a:r>
-            <a:r>
-              <a:rPr lang="en-US" dirty="0" err="1" smtClean="0"/>
-              <a:t>monthlyPay</a:t>
-            </a:r>
-            <a:r>
-              <a:rPr lang="en-US" dirty="0" smtClean="0"/>
-              <a:t> - </a:t>
-            </a:r>
-            <a:r>
-              <a:rPr lang="en-US" dirty="0" err="1" smtClean="0"/>
-              <a:t>monthlyExpenses</a:t>
-            </a:r>
-            <a:r>
-              <a:rPr lang="en-US" dirty="0" smtClean="0"/>
-              <a:t>;</a:t>
-            </a:r>
-            <a:r>
-              <a:rPr lang="en-US" dirty="0"/>
-              <a:t>	</a:t>
-            </a:r>
-            <a:endParaRPr lang="en-US" dirty="0" smtClean="0"/>
-          </a:p>
-          <a:p>
-            <a:pPr marL="0" indent="0">
-              <a:buNone/>
-            </a:pPr>
-            <a:r>
-              <a:rPr lang="en-US" dirty="0"/>
-              <a:t>	</a:t>
-            </a:r>
+              <a:t>…</a:t>
+            </a:r>
+            <a:endParaRPr lang="en-US" dirty="0"/>
           </a:p>
         </p:txBody>
       </p:sp>
     </p:spTree>
     <p:extLst>
       <p:ext uri="{BB962C8B-B14F-4D97-AF65-F5344CB8AC3E}">
-        <p14:creationId xmlns:p14="http://schemas.microsoft.com/office/powerpoint/2010/main" val="4279312857"/>
+        <p14:creationId xmlns:p14="http://schemas.microsoft.com/office/powerpoint/2010/main" val="297399840"/>
+      </p:ext>
+    </p:extLst>
+  </p:cSld>
+  <p:clrMapOvr>
+    <a:masterClrMapping/>
+  </p:clrMapOvr>
+</p:sld>
+</file>
+
+<file path=ppt/slides/slide7.xml><?xml version="1.0" encoding="utf-8"?>
+<p:sld xmlns:a="http://schemas.openxmlformats.org/drawingml/2006/main" xmlns:r="http://schemas.openxmlformats.org/officeDocument/2006/relationships" xmlns:p="http://schemas.openxmlformats.org/presentationml/2006/main">
+  <p:cSld>
+    <p:spTree>
+      <p:nvGrpSpPr>
+        <p:cNvPr id="1" name=""/>
+        <p:cNvGrpSpPr/>
+        <p:nvPr/>
+      </p:nvGrpSpPr>
+      <p:grpSpPr>
+        <a:xfrm>
+          <a:off x="0" y="0"/>
+          <a:ext cx="0" cy="0"/>
+          <a:chOff x="0" y="0"/>
+          <a:chExt cx="0" cy="0"/>
+        </a:xfrm>
+      </p:grpSpPr>
+      <p:sp>
+        <p:nvSpPr>
+          <p:cNvPr id="2" name="Title 1"/>
+          <p:cNvSpPr>
+            <a:spLocks noGrp="1"/>
+          </p:cNvSpPr>
+          <p:nvPr>
+            <p:ph type="title"/>
+          </p:nvPr>
+        </p:nvSpPr>
+        <p:spPr/>
+        <p:txBody>
+          <a:bodyPr/>
+          <a:lstStyle/>
+          <a:p>
+            <a:r>
+              <a:rPr lang="en-US" dirty="0" smtClean="0"/>
+              <a:t>Activity 3</a:t>
+            </a:r>
+            <a:endParaRPr lang="en-US" dirty="0"/>
+          </a:p>
+        </p:txBody>
+      </p:sp>
+      <p:sp>
+        <p:nvSpPr>
+          <p:cNvPr id="3" name="Content Placeholder 2"/>
+          <p:cNvSpPr>
+            <a:spLocks noGrp="1"/>
+          </p:cNvSpPr>
+          <p:nvPr>
+            <p:ph idx="1"/>
+          </p:nvPr>
+        </p:nvSpPr>
+        <p:spPr/>
+        <p:txBody>
+          <a:bodyPr/>
+          <a:lstStyle/>
+          <a:p>
+            <a:pPr marL="0" indent="0">
+              <a:buNone/>
+            </a:pPr>
+            <a:r>
+              <a:rPr lang="en-US" dirty="0" smtClean="0"/>
+              <a:t>public static String </a:t>
+            </a:r>
+            <a:r>
+              <a:rPr lang="en-US" dirty="0" err="1" smtClean="0"/>
+              <a:t>promptUser</a:t>
+            </a:r>
+            <a:r>
+              <a:rPr lang="en-US" dirty="0" smtClean="0"/>
+              <a:t>(){</a:t>
+            </a:r>
+          </a:p>
+          <a:p>
+            <a:pPr marL="0" indent="0">
+              <a:buNone/>
+            </a:pPr>
+            <a:r>
+              <a:rPr lang="en-US" dirty="0"/>
+              <a:t>	</a:t>
+            </a:r>
+            <a:r>
+              <a:rPr lang="en-US" dirty="0" smtClean="0"/>
+              <a:t>Scanner </a:t>
+            </a:r>
+            <a:r>
+              <a:rPr lang="en-US" dirty="0" err="1" smtClean="0"/>
+              <a:t>sc</a:t>
+            </a:r>
+            <a:r>
+              <a:rPr lang="en-US" dirty="0" smtClean="0"/>
+              <a:t> = new Scanner(System.in);</a:t>
+            </a:r>
+          </a:p>
+          <a:p>
+            <a:pPr marL="0" indent="0">
+              <a:buNone/>
+            </a:pPr>
+            <a:endParaRPr lang="en-US" dirty="0"/>
+          </a:p>
+          <a:p>
+            <a:pPr marL="0" indent="0">
+              <a:buNone/>
+            </a:pPr>
+            <a:r>
+              <a:rPr lang="en-US" dirty="0" smtClean="0"/>
+              <a:t>	String </a:t>
+            </a:r>
+            <a:r>
+              <a:rPr lang="en-US" dirty="0" err="1" smtClean="0"/>
+              <a:t>userName</a:t>
+            </a:r>
+            <a:r>
+              <a:rPr lang="en-US" dirty="0" smtClean="0"/>
+              <a:t> = </a:t>
+            </a:r>
+            <a:r>
+              <a:rPr lang="en-US" dirty="0" err="1" smtClean="0"/>
+              <a:t>sc.next</a:t>
+            </a:r>
+            <a:r>
+              <a:rPr lang="en-US" dirty="0" smtClean="0"/>
+              <a:t>();</a:t>
+            </a:r>
+          </a:p>
+          <a:p>
+            <a:pPr marL="0" indent="0">
+              <a:buNone/>
+            </a:pPr>
+            <a:endParaRPr lang="en-US" dirty="0"/>
+          </a:p>
+          <a:p>
+            <a:pPr marL="0" indent="0">
+              <a:buNone/>
+            </a:pPr>
+            <a:r>
+              <a:rPr lang="en-US" dirty="0"/>
+              <a:t>	</a:t>
+            </a:r>
+            <a:r>
+              <a:rPr lang="en-US" dirty="0" smtClean="0"/>
+              <a:t>return </a:t>
+            </a:r>
+            <a:r>
+              <a:rPr lang="en-US" dirty="0" err="1" smtClean="0"/>
+              <a:t>userName</a:t>
+            </a:r>
+            <a:r>
+              <a:rPr lang="en-US" dirty="0" smtClean="0"/>
+              <a:t>;</a:t>
+            </a:r>
+            <a:endParaRPr lang="en-US" dirty="0"/>
+          </a:p>
+          <a:p>
+            <a:pPr marL="0" indent="0">
+              <a:buNone/>
+            </a:pPr>
+            <a:r>
+              <a:rPr lang="en-US" dirty="0" smtClean="0"/>
+              <a:t>}</a:t>
+            </a:r>
+            <a:endParaRPr lang="en-US" dirty="0"/>
+          </a:p>
+        </p:txBody>
+      </p:sp>
+    </p:spTree>
+    <p:extLst>
+      <p:ext uri="{BB962C8B-B14F-4D97-AF65-F5344CB8AC3E}">
+        <p14:creationId xmlns:p14="http://schemas.microsoft.com/office/powerpoint/2010/main" val="135158590"/>
+      </p:ext>
+    </p:extLst>
+  </p:cSld>
+  <p:clrMapOvr>
+    <a:masterClrMapping/>
+  </p:clrMapOvr>
+</p:sld>
+</file>
+
+<file path=ppt/slides/slide8.xml><?xml version="1.0" encoding="utf-8"?>
+<p:sld xmlns:a="http://schemas.openxmlformats.org/drawingml/2006/main" xmlns:r="http://schemas.openxmlformats.org/officeDocument/2006/relationships" xmlns:p="http://schemas.openxmlformats.org/presentationml/2006/main">
+  <p:cSld>
+    <p:spTree>
+      <p:nvGrpSpPr>
+        <p:cNvPr id="1" name=""/>
+        <p:cNvGrpSpPr/>
+        <p:nvPr/>
+      </p:nvGrpSpPr>
+      <p:grpSpPr>
+        <a:xfrm>
+          <a:off x="0" y="0"/>
+          <a:ext cx="0" cy="0"/>
+          <a:chOff x="0" y="0"/>
+          <a:chExt cx="0" cy="0"/>
+        </a:xfrm>
+      </p:grpSpPr>
+      <p:sp>
+        <p:nvSpPr>
+          <p:cNvPr id="2" name="Title 1"/>
+          <p:cNvSpPr>
+            <a:spLocks noGrp="1"/>
+          </p:cNvSpPr>
+          <p:nvPr>
+            <p:ph type="title"/>
+          </p:nvPr>
+        </p:nvSpPr>
+        <p:spPr/>
+        <p:txBody>
+          <a:bodyPr/>
+          <a:lstStyle/>
+          <a:p>
+            <a:r>
+              <a:rPr lang="en-US" dirty="0" smtClean="0"/>
+              <a:t>Activity 4</a:t>
+            </a:r>
+            <a:endParaRPr lang="en-US" dirty="0"/>
+          </a:p>
+        </p:txBody>
+      </p:sp>
+      <p:sp>
+        <p:nvSpPr>
+          <p:cNvPr id="3" name="Content Placeholder 2"/>
+          <p:cNvSpPr>
+            <a:spLocks noGrp="1"/>
+          </p:cNvSpPr>
+          <p:nvPr>
+            <p:ph idx="1"/>
+          </p:nvPr>
+        </p:nvSpPr>
+        <p:spPr/>
+        <p:txBody>
+          <a:bodyPr/>
+          <a:lstStyle/>
+          <a:p>
+            <a:r>
+              <a:rPr lang="en-US" dirty="0" smtClean="0"/>
+              <a:t>Try to be as detail-oriented as you can be</a:t>
+            </a:r>
+          </a:p>
+          <a:p>
+            <a:r>
+              <a:rPr lang="en-US" dirty="0" smtClean="0"/>
+              <a:t>Be clear</a:t>
+            </a:r>
+          </a:p>
+          <a:p>
+            <a:r>
+              <a:rPr lang="en-US" dirty="0" smtClean="0"/>
+              <a:t>Instead of “Enter a percentage for electricity”, output</a:t>
+            </a:r>
+          </a:p>
+          <a:p>
+            <a:pPr marL="0" indent="0">
+              <a:buNone/>
+            </a:pPr>
+            <a:r>
+              <a:rPr lang="en-US" dirty="0"/>
+              <a:t>	</a:t>
+            </a:r>
+            <a:r>
+              <a:rPr lang="en-US" dirty="0" smtClean="0"/>
+              <a:t>“Enter a percentage, in decimals, of your bill that goes to your 		electricity”</a:t>
+            </a:r>
+          </a:p>
+        </p:txBody>
+      </p:sp>
+    </p:spTree>
+    <p:extLst>
+      <p:ext uri="{BB962C8B-B14F-4D97-AF65-F5344CB8AC3E}">
+        <p14:creationId xmlns:p14="http://schemas.microsoft.com/office/powerpoint/2010/main" val="2713568829"/>
+      </p:ext>
+    </p:extLst>
+  </p:cSld>
+  <p:clrMapOvr>
+    <a:masterClrMapping/>
+  </p:clrMapOvr>
+</p:sld>
+</file>
+
+<file path=ppt/slides/slide9.xml><?xml version="1.0" encoding="utf-8"?>
+<p:sld xmlns:a="http://schemas.openxmlformats.org/drawingml/2006/main" xmlns:r="http://schemas.openxmlformats.org/officeDocument/2006/relationships" xmlns:p="http://schemas.openxmlformats.org/presentationml/2006/main">
+  <p:cSld>
+    <p:spTree>
+      <p:nvGrpSpPr>
+        <p:cNvPr id="1" name=""/>
+        <p:cNvGrpSpPr/>
+        <p:nvPr/>
+      </p:nvGrpSpPr>
+      <p:grpSpPr>
+        <a:xfrm>
+          <a:off x="0" y="0"/>
+          <a:ext cx="0" cy="0"/>
+          <a:chOff x="0" y="0"/>
+          <a:chExt cx="0" cy="0"/>
+        </a:xfrm>
+      </p:grpSpPr>
+      <p:sp>
+        <p:nvSpPr>
+          <p:cNvPr id="2" name="Title 1"/>
+          <p:cNvSpPr>
+            <a:spLocks noGrp="1"/>
+          </p:cNvSpPr>
+          <p:nvPr>
+            <p:ph type="title"/>
+          </p:nvPr>
+        </p:nvSpPr>
+        <p:spPr/>
+        <p:txBody>
+          <a:bodyPr/>
+          <a:lstStyle/>
+          <a:p>
+            <a:r>
+              <a:rPr lang="en-US" dirty="0" smtClean="0"/>
+              <a:t>Command-line input</a:t>
+            </a:r>
+            <a:endParaRPr lang="en-US" dirty="0"/>
+          </a:p>
+        </p:txBody>
+      </p:sp>
+      <p:sp>
+        <p:nvSpPr>
+          <p:cNvPr id="3" name="Content Placeholder 2"/>
+          <p:cNvSpPr>
+            <a:spLocks noGrp="1"/>
+          </p:cNvSpPr>
+          <p:nvPr>
+            <p:ph idx="1"/>
+          </p:nvPr>
+        </p:nvSpPr>
+        <p:spPr/>
+        <p:txBody>
+          <a:bodyPr/>
+          <a:lstStyle/>
+          <a:p>
+            <a:r>
+              <a:rPr lang="en-US" dirty="0" smtClean="0"/>
+              <a:t>Use Scanner (let’s pretend the Scanner variable is named </a:t>
+            </a:r>
+            <a:r>
+              <a:rPr lang="en-US" dirty="0" err="1" smtClean="0"/>
+              <a:t>sc</a:t>
+            </a:r>
+            <a:r>
+              <a:rPr lang="en-US" dirty="0" smtClean="0"/>
+              <a:t>):</a:t>
+            </a:r>
+          </a:p>
+          <a:p>
+            <a:pPr marL="457200" lvl="1" indent="0">
+              <a:buNone/>
+            </a:pPr>
+            <a:r>
+              <a:rPr lang="en-US" dirty="0" smtClean="0"/>
+              <a:t>Scanner </a:t>
+            </a:r>
+            <a:r>
+              <a:rPr lang="en-US" dirty="0" err="1" smtClean="0"/>
+              <a:t>sc</a:t>
+            </a:r>
+            <a:r>
+              <a:rPr lang="en-US" dirty="0" smtClean="0"/>
+              <a:t> = new Scanner(System.in);</a:t>
+            </a:r>
+          </a:p>
+          <a:p>
+            <a:r>
+              <a:rPr lang="en-US" dirty="0" smtClean="0"/>
+              <a:t>To grab the next String entered by a user, use </a:t>
+            </a:r>
+            <a:r>
+              <a:rPr lang="en-US" dirty="0" err="1" smtClean="0"/>
+              <a:t>sc.next</a:t>
+            </a:r>
+            <a:r>
+              <a:rPr lang="en-US" dirty="0" smtClean="0"/>
+              <a:t>();</a:t>
+            </a:r>
+          </a:p>
+          <a:p>
+            <a:r>
+              <a:rPr lang="en-US" dirty="0" smtClean="0"/>
+              <a:t>To grab the next </a:t>
+            </a:r>
+            <a:r>
+              <a:rPr lang="en-US" dirty="0" err="1" smtClean="0"/>
+              <a:t>int</a:t>
+            </a:r>
+            <a:r>
+              <a:rPr lang="en-US" dirty="0" smtClean="0"/>
+              <a:t> or double or float, use if statements</a:t>
+            </a:r>
+          </a:p>
+          <a:p>
+            <a:endParaRPr lang="en-US" dirty="0"/>
+          </a:p>
+        </p:txBody>
+      </p:sp>
+    </p:spTree>
+    <p:extLst>
+      <p:ext uri="{BB962C8B-B14F-4D97-AF65-F5344CB8AC3E}">
+        <p14:creationId xmlns:p14="http://schemas.microsoft.com/office/powerpoint/2010/main" val="1459983907"/>
       </p:ext>
     </p:extLst>
   </p:cSld>

</xml_diff>

<commit_message>
updated week 4 powerpoint again
week 4
</commit_message>
<xml_diff>
--- a/Powerpoints/CS0007 Week 4.pptx
+++ b/Powerpoints/CS0007 Week 4.pptx
@@ -3529,7 +3529,9 @@
         </p:nvSpPr>
         <p:spPr/>
         <p:txBody>
-          <a:bodyPr/>
+          <a:bodyPr>
+            <a:normAutofit lnSpcReduction="10000"/>
+          </a:bodyPr>
           <a:lstStyle/>
           <a:p>
             <a:r>
@@ -3538,9 +3540,24 @@
             </a:r>
           </a:p>
           <a:p>
-            <a:r>
-              <a:rPr lang="en-US" dirty="0" smtClean="0"/>
-              <a:t>/*Author Name</a:t>
+            <a:pPr marL="0" indent="0">
+              <a:buNone/>
+            </a:pPr>
+            <a:r>
+              <a:rPr lang="en-US" dirty="0"/>
+              <a:t> </a:t>
+            </a:r>
+            <a:r>
+              <a:rPr lang="en-US" dirty="0" smtClean="0"/>
+              <a:t>  	</a:t>
+            </a:r>
+            <a:r>
+              <a:rPr lang="en-US" dirty="0" smtClean="0"/>
+              <a:t>/*</a:t>
+            </a:r>
+            <a:r>
+              <a:rPr lang="en-US" dirty="0" smtClean="0"/>
+              <a:t>Author Name</a:t>
             </a:r>
           </a:p>
           <a:p>
@@ -3585,8 +3602,33 @@
           <a:p>
             <a:r>
               <a:rPr lang="en-US" dirty="0" smtClean="0"/>
-              <a:t>Use the best variables for each piece of data</a:t>
-            </a:r>
+              <a:t>Use the best variables for each piece of </a:t>
+            </a:r>
+            <a:r>
+              <a:rPr lang="en-US" dirty="0" smtClean="0"/>
+              <a:t>data</a:t>
+            </a:r>
+          </a:p>
+          <a:p>
+            <a:r>
+              <a:rPr lang="en-US" dirty="0" smtClean="0"/>
+              <a:t>Make sure to work on activities outside of class</a:t>
+            </a:r>
+          </a:p>
+          <a:p>
+            <a:r>
+              <a:rPr lang="en-US" dirty="0" smtClean="0"/>
+              <a:t>Don’t forget to show me your program when you are finished</a:t>
+            </a:r>
+            <a:r>
+              <a:rPr lang="en-US" dirty="0"/>
+              <a:t> </a:t>
+            </a:r>
+            <a:r>
+              <a:rPr lang="en-US" dirty="0" smtClean="0"/>
+              <a:t>with an activity</a:t>
+            </a:r>
+            <a:endParaRPr lang="en-US" dirty="0" smtClean="0"/>
           </a:p>
         </p:txBody>
       </p:sp>
@@ -3753,11 +3795,7 @@
             </a:r>
             <a:r>
               <a:rPr lang="en-US" dirty="0" smtClean="0"/>
-              <a:t>(“My name is </a:t>
-            </a:r>
-            <a:r>
-              <a:rPr lang="en-US" dirty="0" smtClean="0"/>
-              <a:t>James</a:t>
+              <a:t>(“My name is James</a:t>
             </a:r>
             <a:r>
               <a:rPr lang="en-US" dirty="0"/>
@@ -3765,11 +3803,7 @@
             </a:r>
             <a:r>
               <a:rPr lang="en-US" dirty="0" smtClean="0"/>
-              <a:t>Hahn and this budget calculator will transform your empty pockets into cash!</a:t>
-            </a:r>
-            <a:r>
-              <a:rPr lang="en-US" dirty="0" smtClean="0"/>
-              <a:t>”);</a:t>
+              <a:t>Hahn and this budget calculator will transform your empty pockets into cash!”);</a:t>
             </a:r>
           </a:p>
           <a:p>

</xml_diff>

<commit_message>
updated week 4 documents
</commit_message>
<xml_diff>
--- a/Powerpoints/CS0007 Week 4.pptx
+++ b/Powerpoints/CS0007 Week 4.pptx
@@ -3128,8 +3128,13 @@
             </a:pPr>
             <a:r>
               <a:rPr lang="en-US" dirty="0" smtClean="0"/>
-              <a:t>Multiplication and Division:</a:t>
-            </a:r>
+              <a:t>Multiplication and </a:t>
+            </a:r>
+            <a:r>
+              <a:rPr lang="en-US" dirty="0" smtClean="0"/>
+              <a:t>Division ( * and / ):</a:t>
+            </a:r>
+            <a:endParaRPr lang="en-US" dirty="0" smtClean="0"/>
           </a:p>
           <a:p>
             <a:pPr marL="0" indent="0">
@@ -3242,8 +3247,13 @@
             </a:pPr>
             <a:r>
               <a:rPr lang="en-US" dirty="0" smtClean="0"/>
-              <a:t>Addition and Subtraction:</a:t>
-            </a:r>
+              <a:t>Addition and </a:t>
+            </a:r>
+            <a:r>
+              <a:rPr lang="en-US" dirty="0" smtClean="0"/>
+              <a:t>Subtraction ( + and - ):</a:t>
+            </a:r>
+            <a:endParaRPr lang="en-US" dirty="0" smtClean="0"/>
           </a:p>
           <a:p>
             <a:pPr marL="0" indent="0">
@@ -3530,7 +3540,7 @@
         <p:spPr/>
         <p:txBody>
           <a:bodyPr>
-            <a:normAutofit lnSpcReduction="10000"/>
+            <a:normAutofit fontScale="92500" lnSpcReduction="10000"/>
           </a:bodyPr>
           <a:lstStyle/>
           <a:p>
@@ -3549,15 +3559,7 @@
             </a:r>
             <a:r>
               <a:rPr lang="en-US" dirty="0" smtClean="0"/>
-              <a:t>  	</a:t>
-            </a:r>
-            <a:r>
-              <a:rPr lang="en-US" dirty="0" smtClean="0"/>
-              <a:t>/*</a:t>
-            </a:r>
-            <a:r>
-              <a:rPr lang="en-US" dirty="0" smtClean="0"/>
-              <a:t>Author Name</a:t>
+              <a:t>  	/*Author Name</a:t>
             </a:r>
           </a:p>
           <a:p>
@@ -3612,6 +3614,13 @@
           <a:p>
             <a:r>
               <a:rPr lang="en-US" dirty="0" smtClean="0"/>
+              <a:t>Comment each variable, describing its purpose</a:t>
+            </a:r>
+            <a:endParaRPr lang="en-US" dirty="0" smtClean="0"/>
+          </a:p>
+          <a:p>
+            <a:r>
+              <a:rPr lang="en-US" dirty="0" smtClean="0"/>
               <a:t>Make sure to work on activities outside of class</a:t>
             </a:r>
           </a:p>
@@ -3628,7 +3637,6 @@
               <a:rPr lang="en-US" dirty="0" smtClean="0"/>
               <a:t>with an activity</a:t>
             </a:r>
-            <a:endParaRPr lang="en-US" dirty="0" smtClean="0"/>
           </a:p>
         </p:txBody>
       </p:sp>
@@ -3790,12 +3798,12 @@
           <a:lstStyle/>
           <a:p>
             <a:r>
-              <a:rPr lang="en-US" dirty="0" err="1" smtClean="0"/>
-              <a:t>System.out.println</a:t>
-            </a:r>
-            <a:r>
-              <a:rPr lang="en-US" dirty="0" smtClean="0"/>
-              <a:t>(“My name is James</a:t>
+              <a:rPr lang="en-US" dirty="0" smtClean="0"/>
+              <a:t>“</a:t>
+            </a:r>
+            <a:r>
+              <a:rPr lang="en-US" dirty="0" smtClean="0"/>
+              <a:t>My name is James</a:t>
             </a:r>
             <a:r>
               <a:rPr lang="en-US" dirty="0"/>
@@ -3803,8 +3811,13 @@
             </a:r>
             <a:r>
               <a:rPr lang="en-US" dirty="0" smtClean="0"/>
-              <a:t>Hahn and this budget calculator will transform your empty pockets into cash!”);</a:t>
-            </a:r>
+              <a:t>Hahn and this budget calculator will transform your empty pockets into cash</a:t>
+            </a:r>
+            <a:r>
+              <a:rPr lang="en-US" dirty="0" smtClean="0"/>
+              <a:t>!”</a:t>
+            </a:r>
+            <a:endParaRPr lang="en-US" dirty="0" smtClean="0"/>
           </a:p>
           <a:p>
             <a:r>
@@ -3815,8 +3828,13 @@
           <a:p>
             <a:r>
               <a:rPr lang="en-US" dirty="0" smtClean="0"/>
-              <a:t>Why does the user want to use this?</a:t>
-            </a:r>
+              <a:t>Why does the user want to use </a:t>
+            </a:r>
+            <a:r>
+              <a:rPr lang="en-US" dirty="0" smtClean="0"/>
+              <a:t>this program?</a:t>
+            </a:r>
+            <a:endParaRPr lang="en-US" dirty="0" smtClean="0"/>
           </a:p>
           <a:p>
             <a:endParaRPr lang="en-US" dirty="0"/>
@@ -3908,7 +3926,11 @@
             </a:r>
             <a:r>
               <a:rPr lang="en-US" dirty="0" smtClean="0"/>
-              <a:t>; //Regular hourly pay rate</a:t>
+              <a:t> = 10.0; </a:t>
+            </a:r>
+            <a:r>
+              <a:rPr lang="en-US" dirty="0" smtClean="0"/>
+              <a:t>//Regular hourly pay rate</a:t>
             </a:r>
           </a:p>
           <a:p>
@@ -3925,11 +3947,15 @@
             </a:r>
             <a:r>
               <a:rPr lang="en-US" dirty="0" err="1" smtClean="0"/>
-              <a:t>rateOvertime</a:t>
-            </a:r>
-            <a:r>
-              <a:rPr lang="en-US" dirty="0" smtClean="0"/>
-              <a:t>; //Overtime hourly pay rate</a:t>
+              <a:t>hoursWorked</a:t>
+            </a:r>
+            <a:r>
+              <a:rPr lang="en-US" dirty="0" smtClean="0"/>
+              <a:t> = 5; </a:t>
+            </a:r>
+            <a:r>
+              <a:rPr lang="en-US" dirty="0" smtClean="0"/>
+              <a:t>//Overtime hourly pay rate</a:t>
             </a:r>
           </a:p>
           <a:p>
@@ -4015,23 +4041,51 @@
         </p:nvSpPr>
         <p:spPr/>
         <p:txBody>
-          <a:bodyPr/>
-          <a:lstStyle/>
+          <a:bodyPr>
+            <a:normAutofit fontScale="92500" lnSpcReduction="10000"/>
+          </a:bodyPr>
+          <a:lstStyle/>
+          <a:p>
+            <a:pPr marL="514350" indent="-514350">
+              <a:buAutoNum type="arabicPeriod"/>
+            </a:pPr>
+            <a:r>
+              <a:rPr lang="en-US" dirty="0" smtClean="0"/>
+              <a:t>Import material for Scanner at the very top of your program (after your header and before your class) with:</a:t>
+            </a:r>
+          </a:p>
+          <a:p>
+            <a:pPr marL="457200" lvl="1" indent="0">
+              <a:buNone/>
+            </a:pPr>
+            <a:r>
+              <a:rPr lang="en-US" dirty="0"/>
+              <a:t>i</a:t>
+            </a:r>
+            <a:r>
+              <a:rPr lang="en-US" dirty="0" smtClean="0"/>
+              <a:t>mport </a:t>
+            </a:r>
+            <a:r>
+              <a:rPr lang="en-US" dirty="0" err="1" smtClean="0"/>
+              <a:t>java.util</a:t>
+            </a:r>
+            <a:r>
+              <a:rPr lang="en-US" dirty="0" smtClean="0"/>
+              <a:t>.*;</a:t>
+            </a:r>
+          </a:p>
           <a:p>
             <a:pPr marL="0" indent="0">
               <a:buNone/>
             </a:pPr>
             <a:r>
               <a:rPr lang="en-US" dirty="0" smtClean="0"/>
-              <a:t>public static String </a:t>
-            </a:r>
-            <a:r>
-              <a:rPr lang="en-US" dirty="0" err="1" smtClean="0"/>
-              <a:t>promptUser</a:t>
-            </a:r>
-            <a:r>
-              <a:rPr lang="en-US" dirty="0" smtClean="0"/>
-              <a:t>(){</a:t>
+              <a:t>2</a:t>
+            </a:r>
+            <a:r>
+              <a:rPr lang="en-US" dirty="0" smtClean="0"/>
+              <a:t>. Make a method with return type String in your class but not in main()</a:t>
             </a:r>
           </a:p>
           <a:p>
@@ -4044,15 +4098,54 @@
             </a:r>
             <a:r>
               <a:rPr lang="en-US" dirty="0" smtClean="0"/>
-              <a:t>Scanner </a:t>
+              <a:t>public static String </a:t>
             </a:r>
             <a:r>
               <a:rPr lang="en-US" dirty="0" err="1" smtClean="0"/>
-              <a:t>sc</a:t>
-            </a:r>
-            <a:r>
-              <a:rPr lang="en-US" dirty="0" smtClean="0"/>
-              <a:t> = new Scanner(System.in);</a:t>
+              <a:t>getUserName</a:t>
+            </a:r>
+            <a:r>
+              <a:rPr lang="en-US" dirty="0" smtClean="0"/>
+              <a:t>()</a:t>
+            </a:r>
+          </a:p>
+          <a:p>
+            <a:pPr marL="0" indent="0">
+              <a:buNone/>
+            </a:pPr>
+            <a:r>
+              <a:rPr lang="en-US" dirty="0"/>
+              <a:t>3</a:t>
+            </a:r>
+            <a:r>
+              <a:rPr lang="en-US" dirty="0" smtClean="0"/>
+              <a:t>. Create a scanner</a:t>
+            </a:r>
+          </a:p>
+          <a:p>
+            <a:pPr marL="0" indent="0">
+              <a:buNone/>
+            </a:pPr>
+            <a:r>
+              <a:rPr lang="en-US" dirty="0"/>
+              <a:t>4</a:t>
+            </a:r>
+            <a:r>
+              <a:rPr lang="en-US" dirty="0" smtClean="0"/>
+              <a:t>. Ask the user for a variable</a:t>
+            </a:r>
+          </a:p>
+          <a:p>
+            <a:pPr marL="0" indent="0">
+              <a:buNone/>
+            </a:pPr>
+            <a:r>
+              <a:rPr lang="en-US" dirty="0"/>
+              <a:t>5</a:t>
+            </a:r>
+            <a:r>
+              <a:rPr lang="en-US" dirty="0" smtClean="0"/>
+              <a:t>. Return that variable to main()</a:t>
             </a:r>
           </a:p>
           <a:p>
@@ -4066,61 +4159,12 @@
               <a:buNone/>
             </a:pPr>
             <a:r>
-              <a:rPr lang="en-US" dirty="0" smtClean="0"/>
-              <a:t>	String </a:t>
-            </a:r>
-            <a:r>
-              <a:rPr lang="en-US" dirty="0" err="1" smtClean="0"/>
-              <a:t>userName</a:t>
-            </a:r>
-            <a:r>
-              <a:rPr lang="en-US" dirty="0" smtClean="0"/>
-              <a:t> = </a:t>
-            </a:r>
-            <a:r>
-              <a:rPr lang="en-US" dirty="0" err="1" smtClean="0"/>
-              <a:t>sc.next</a:t>
-            </a:r>
-            <a:r>
-              <a:rPr lang="en-US" dirty="0" smtClean="0"/>
-              <a:t>();</a:t>
-            </a:r>
-          </a:p>
-          <a:p>
-            <a:pPr marL="0" indent="0">
-              <a:buNone/>
-            </a:pPr>
-            <a:endParaRPr lang="en-US" dirty="0"/>
-          </a:p>
-          <a:p>
-            <a:pPr marL="0" indent="0">
-              <a:buNone/>
-            </a:pPr>
-            <a:r>
               <a:rPr lang="en-US" dirty="0"/>
-              <a:t>	</a:t>
-            </a:r>
-            <a:r>
-              <a:rPr lang="en-US" dirty="0" smtClean="0"/>
-              <a:t>return </a:t>
-            </a:r>
-            <a:r>
-              <a:rPr lang="en-US" dirty="0" err="1" smtClean="0"/>
-              <a:t>userName</a:t>
-            </a:r>
-            <a:r>
-              <a:rPr lang="en-US" dirty="0" smtClean="0"/>
-              <a:t>;</a:t>
-            </a:r>
-            <a:endParaRPr lang="en-US" dirty="0"/>
-          </a:p>
-          <a:p>
-            <a:pPr marL="0" indent="0">
-              <a:buNone/>
-            </a:pPr>
-            <a:r>
-              <a:rPr lang="en-US" dirty="0" smtClean="0"/>
-              <a:t>}</a:t>
+              <a:t>6</a:t>
+            </a:r>
+            <a:r>
+              <a:rPr lang="en-US" dirty="0" smtClean="0"/>
+              <a:t>. Apply this to future variables</a:t>
             </a:r>
             <a:endParaRPr lang="en-US" dirty="0"/>
           </a:p>
@@ -4191,7 +4235,9 @@
         </p:nvSpPr>
         <p:spPr/>
         <p:txBody>
-          <a:bodyPr/>
+          <a:bodyPr>
+            <a:normAutofit lnSpcReduction="10000"/>
+          </a:bodyPr>
           <a:lstStyle/>
           <a:p>
             <a:r>
@@ -4208,8 +4254,13 @@
           <a:p>
             <a:r>
               <a:rPr lang="en-US" dirty="0" smtClean="0"/>
-              <a:t>Instead of “Enter a percentage for electricity”, output</a:t>
-            </a:r>
+              <a:t>Instead of “Enter a percentage for electricity”, </a:t>
+            </a:r>
+            <a:r>
+              <a:rPr lang="en-US" dirty="0" smtClean="0"/>
+              <a:t>print</a:t>
+            </a:r>
+            <a:endParaRPr lang="en-US" dirty="0" smtClean="0"/>
           </a:p>
           <a:p>
             <a:pPr marL="0" indent="0">
@@ -4221,8 +4272,53 @@
             </a:r>
             <a:r>
               <a:rPr lang="en-US" dirty="0" smtClean="0"/>
-              <a:t>“Enter a percentage, in decimals, of your bill that goes to your 		electricity”</a:t>
-            </a:r>
+              <a:t>“Enter a percentage, in decimals, of your bill that goes to your 		</a:t>
+            </a:r>
+            <a:r>
+              <a:rPr lang="en-US" dirty="0" smtClean="0"/>
+              <a:t>electricity: ” or</a:t>
+            </a:r>
+          </a:p>
+          <a:p>
+            <a:pPr marL="0" indent="0">
+              <a:buNone/>
+            </a:pPr>
+            <a:r>
+              <a:rPr lang="en-US" dirty="0"/>
+              <a:t>	</a:t>
+            </a:r>
+            <a:r>
+              <a:rPr lang="en-US" dirty="0" smtClean="0"/>
+              <a:t>“Enter a percentage, in whole numbers, of your bill that goes to 	your electricity each month: ”</a:t>
+            </a:r>
+          </a:p>
+          <a:p>
+            <a:pPr marL="0" indent="0">
+              <a:buNone/>
+            </a:pPr>
+            <a:endParaRPr lang="en-US" dirty="0"/>
+          </a:p>
+          <a:p>
+            <a:pPr marL="0" indent="0">
+              <a:buNone/>
+            </a:pPr>
+            <a:r>
+              <a:rPr lang="en-US" dirty="0" smtClean="0"/>
+              <a:t>Make sure to use </a:t>
+            </a:r>
+            <a:r>
+              <a:rPr lang="en-US" dirty="0" err="1" smtClean="0"/>
+              <a:t>printf</a:t>
+            </a:r>
+            <a:r>
+              <a:rPr lang="en-US" dirty="0"/>
+              <a:t> </a:t>
+            </a:r>
+            <a:r>
+              <a:rPr lang="en-US" dirty="0" smtClean="0"/>
+              <a:t>in activities 4 and 5 as described in the project instructions</a:t>
+            </a:r>
+            <a:endParaRPr lang="en-US" dirty="0" smtClean="0"/>
           </a:p>
         </p:txBody>
       </p:sp>
@@ -4349,11 +4445,148 @@
             </a:r>
             <a:r>
               <a:rPr lang="en-US" dirty="0" smtClean="0"/>
-              <a:t> or double or float, use if statements</a:t>
-            </a:r>
-          </a:p>
-          <a:p>
-            <a:endParaRPr lang="en-US" dirty="0"/>
+              <a:t> or double or float, </a:t>
+            </a:r>
+            <a:r>
+              <a:rPr lang="en-US" dirty="0" smtClean="0"/>
+              <a:t>use:</a:t>
+            </a:r>
+          </a:p>
+          <a:p>
+            <a:pPr marL="457200" lvl="1" indent="0">
+              <a:buNone/>
+            </a:pPr>
+            <a:r>
+              <a:rPr lang="en-US" b="1" dirty="0" err="1" smtClean="0"/>
+              <a:t>int</a:t>
+            </a:r>
+            <a:r>
+              <a:rPr lang="en-US" b="1" dirty="0" smtClean="0"/>
+              <a:t> a = </a:t>
+            </a:r>
+            <a:r>
+              <a:rPr lang="en-US" b="1" dirty="0" err="1" smtClean="0"/>
+              <a:t>Integer.parseInt</a:t>
+            </a:r>
+            <a:r>
+              <a:rPr lang="en-US" b="1" dirty="0" smtClean="0"/>
+              <a:t>(</a:t>
+            </a:r>
+            <a:r>
+              <a:rPr lang="en-US" b="1" dirty="0" err="1" smtClean="0"/>
+              <a:t>sc.next</a:t>
+            </a:r>
+            <a:r>
+              <a:rPr lang="en-US" b="1" dirty="0" smtClean="0"/>
+              <a:t>()); </a:t>
+            </a:r>
+            <a:r>
+              <a:rPr lang="en-US" dirty="0" smtClean="0"/>
+              <a:t>OR </a:t>
+            </a:r>
+            <a:r>
+              <a:rPr lang="en-US" b="1" dirty="0" err="1" smtClean="0"/>
+              <a:t>int</a:t>
+            </a:r>
+            <a:r>
+              <a:rPr lang="en-US" b="1" dirty="0" smtClean="0"/>
+              <a:t> a = </a:t>
+            </a:r>
+            <a:r>
+              <a:rPr lang="en-US" b="1" dirty="0" err="1" smtClean="0"/>
+              <a:t>sc.nextInt</a:t>
+            </a:r>
+            <a:r>
+              <a:rPr lang="en-US" b="1" dirty="0" smtClean="0"/>
+              <a:t>();</a:t>
+            </a:r>
+            <a:endParaRPr lang="en-US" b="1" dirty="0" smtClean="0"/>
+          </a:p>
+          <a:p>
+            <a:pPr marL="457200" lvl="1" indent="0">
+              <a:buNone/>
+            </a:pPr>
+            <a:r>
+              <a:rPr lang="en-US" b="1" dirty="0" smtClean="0"/>
+              <a:t>double d = </a:t>
+            </a:r>
+            <a:r>
+              <a:rPr lang="en-US" b="1" dirty="0" err="1" smtClean="0"/>
+              <a:t>Double.parseDouble</a:t>
+            </a:r>
+            <a:r>
+              <a:rPr lang="en-US" b="1" dirty="0" smtClean="0"/>
+              <a:t>(</a:t>
+            </a:r>
+            <a:r>
+              <a:rPr lang="en-US" b="1" dirty="0" err="1" smtClean="0"/>
+              <a:t>sc.next</a:t>
+            </a:r>
+            <a:r>
+              <a:rPr lang="en-US" b="1" dirty="0" smtClean="0"/>
+              <a:t>())</a:t>
+            </a:r>
+            <a:r>
+              <a:rPr lang="en-US" b="1" dirty="0"/>
+              <a:t>;</a:t>
+            </a:r>
+            <a:r>
+              <a:rPr lang="en-US" dirty="0" smtClean="0"/>
+              <a:t> OR </a:t>
+            </a:r>
+            <a:r>
+              <a:rPr lang="en-US" b="1" dirty="0" smtClean="0"/>
+              <a:t>double d = </a:t>
+            </a:r>
+            <a:r>
+              <a:rPr lang="en-US" b="1" dirty="0" err="1" smtClean="0"/>
+              <a:t>sc.nextDouble</a:t>
+            </a:r>
+            <a:r>
+              <a:rPr lang="en-US" b="1" dirty="0" smtClean="0"/>
+              <a:t>();</a:t>
+            </a:r>
+          </a:p>
+          <a:p>
+            <a:pPr marL="457200" lvl="1" indent="0">
+              <a:buNone/>
+            </a:pPr>
+            <a:r>
+              <a:rPr lang="en-US" b="1" dirty="0" smtClean="0"/>
+              <a:t>float f = </a:t>
+            </a:r>
+            <a:r>
+              <a:rPr lang="en-US" b="1" dirty="0" err="1" smtClean="0"/>
+              <a:t>Float.parseFloat</a:t>
+            </a:r>
+            <a:r>
+              <a:rPr lang="en-US" b="1" dirty="0" smtClean="0"/>
+              <a:t>(</a:t>
+            </a:r>
+            <a:r>
+              <a:rPr lang="en-US" b="1" dirty="0" err="1" smtClean="0"/>
+              <a:t>sc.next</a:t>
+            </a:r>
+            <a:r>
+              <a:rPr lang="en-US" b="1" dirty="0" smtClean="0"/>
+              <a:t>()); </a:t>
+            </a:r>
+            <a:r>
+              <a:rPr lang="en-US" dirty="0" smtClean="0"/>
+              <a:t>OR </a:t>
+            </a:r>
+            <a:r>
+              <a:rPr lang="en-US" b="1" dirty="0" smtClean="0"/>
+              <a:t>float f = </a:t>
+            </a:r>
+            <a:r>
+              <a:rPr lang="en-US" b="1" dirty="0" err="1" smtClean="0"/>
+              <a:t>sc.nextFloat</a:t>
+            </a:r>
+            <a:r>
+              <a:rPr lang="en-US" b="1" dirty="0" smtClean="0"/>
+              <a:t>();</a:t>
+            </a:r>
           </a:p>
         </p:txBody>
       </p:sp>

</xml_diff>